<commit_message>
Adicionado código dos demos
</commit_message>
<xml_diff>
--- a/ppt/aspnet-workshop.pptx
+++ b/ppt/aspnet-workshop.pptx
@@ -216,7 +216,7 @@
           <a:p>
             <a:fld id="{4614EB7C-3D23-474B-8548-FB8589D9D05E}" type="datetimeFigureOut">
               <a:rPr lang="pt-PT" smtClean="0"/>
-              <a:t>05/05/2015</a:t>
+              <a:t>17/05/2015</a:t>
             </a:fld>
             <a:endParaRPr lang="pt-PT"/>
           </a:p>
@@ -528,114 +528,7 @@
           <a:bodyPr/>
           <a:lstStyle/>
           <a:p>
-            <a:r>
-              <a:rPr lang="pt-PT" dirty="0" smtClean="0"/>
-              <a:t>Apresentar-me</a:t>
-            </a:r>
-          </a:p>
-          <a:p>
-            <a:pPr marL="171450" indent="-171450">
-              <a:buFontTx/>
-              <a:buChar char="-"/>
-            </a:pPr>
-            <a:r>
-              <a:rPr lang="pt-PT" baseline="0" dirty="0" smtClean="0"/>
-              <a:t>Curso que tirei </a:t>
-            </a:r>
-          </a:p>
-          <a:p>
-            <a:pPr marL="171450" indent="-171450">
-              <a:buFontTx/>
-              <a:buChar char="-"/>
-            </a:pPr>
-            <a:r>
-              <a:rPr lang="pt-PT" baseline="0" dirty="0" smtClean="0"/>
-              <a:t>LI4</a:t>
-            </a:r>
-          </a:p>
-          <a:p>
-            <a:pPr marL="628650" lvl="1" indent="-171450">
-              <a:buFontTx/>
-              <a:buChar char="-"/>
-            </a:pPr>
-            <a:r>
-              <a:rPr lang="pt-PT" baseline="0" dirty="0" smtClean="0"/>
-              <a:t>Dizer diferenças, tínhamos um cliente que era um professor do DI ou de outro departamento.</a:t>
-            </a:r>
-          </a:p>
-          <a:p>
-            <a:pPr marL="171450" indent="-171450">
-              <a:buFontTx/>
-              <a:buChar char="-"/>
-            </a:pPr>
             <a:endParaRPr lang="pt-PT" baseline="0" dirty="0" smtClean="0"/>
-          </a:p>
-          <a:p>
-            <a:pPr marL="0" indent="0">
-              <a:buFontTx/>
-              <a:buNone/>
-            </a:pPr>
-            <a:r>
-              <a:rPr lang="pt-PT" baseline="0" dirty="0" err="1" smtClean="0"/>
-              <a:t>Inelcis</a:t>
-            </a:r>
-            <a:endParaRPr lang="pt-PT" baseline="0" dirty="0" smtClean="0"/>
-          </a:p>
-          <a:p>
-            <a:pPr marL="171450" indent="-171450">
-              <a:buFontTx/>
-              <a:buChar char="-"/>
-            </a:pPr>
-            <a:r>
-              <a:rPr lang="pt-PT" baseline="0" dirty="0" smtClean="0"/>
-              <a:t>Empresa criada em 1999</a:t>
-            </a:r>
-          </a:p>
-          <a:p>
-            <a:pPr marL="171450" indent="-171450">
-              <a:buFontTx/>
-              <a:buChar char="-"/>
-            </a:pPr>
-            <a:r>
-              <a:rPr lang="pt-PT" baseline="0" dirty="0" smtClean="0"/>
-              <a:t>Atualmente desenvolve e dá suporte a laboratórios de análise água, alimentos e anatomia patológica.</a:t>
-            </a:r>
-          </a:p>
-          <a:p>
-            <a:pPr marL="171450" indent="-171450">
-              <a:buFontTx/>
-              <a:buChar char="-"/>
-            </a:pPr>
-            <a:r>
-              <a:rPr lang="pt-PT" baseline="0" dirty="0" smtClean="0"/>
-              <a:t>O CEO é o Engenheiro Nuno Antunes</a:t>
-            </a:r>
-          </a:p>
-          <a:p>
-            <a:pPr marL="171450" indent="-171450">
-              <a:buFontTx/>
-              <a:buChar char="-"/>
-            </a:pPr>
-            <a:r>
-              <a:rPr lang="pt-PT" baseline="0" dirty="0" smtClean="0"/>
-              <a:t>O que faço na </a:t>
-            </a:r>
-            <a:r>
-              <a:rPr lang="pt-PT" baseline="0" dirty="0" err="1" smtClean="0"/>
-              <a:t>inelcis</a:t>
-            </a:r>
-            <a:r>
-              <a:rPr lang="pt-PT" baseline="0" dirty="0" smtClean="0"/>
-              <a:t>: Desenvolver, </a:t>
-            </a:r>
-            <a:r>
-              <a:rPr lang="pt-PT" baseline="0" dirty="0" err="1" smtClean="0"/>
-              <a:t>deploy</a:t>
-            </a:r>
-            <a:r>
-              <a:rPr lang="pt-PT" baseline="0" dirty="0" smtClean="0"/>
-              <a:t> e suporte também</a:t>
-            </a:r>
           </a:p>
         </p:txBody>
       </p:sp>
@@ -719,22 +612,6 @@
           <a:bodyPr/>
           <a:lstStyle/>
           <a:p>
-            <a:r>
-              <a:rPr lang="pt-PT" dirty="0" smtClean="0"/>
-              <a:t>Aconselho</a:t>
-            </a:r>
-            <a:r>
-              <a:rPr lang="pt-PT" baseline="0" dirty="0" smtClean="0"/>
-              <a:t> a utilizar controlo de versões por exemplo o </a:t>
-            </a:r>
-            <a:r>
-              <a:rPr lang="pt-PT" baseline="0" dirty="0" err="1" smtClean="0"/>
-              <a:t>github</a:t>
-            </a:r>
-            <a:r>
-              <a:rPr lang="pt-PT" baseline="0" dirty="0" smtClean="0"/>
-              <a:t>.</a:t>
-            </a:r>
             <a:endParaRPr lang="pt-PT" dirty="0"/>
           </a:p>
         </p:txBody>
@@ -819,75 +696,6 @@
           <a:bodyPr/>
           <a:lstStyle/>
           <a:p>
-            <a:r>
-              <a:rPr lang="pt-PT" dirty="0" smtClean="0"/>
-              <a:t>Criar um projeto já com </a:t>
-            </a:r>
-            <a:r>
-              <a:rPr lang="pt-PT" dirty="0" err="1" smtClean="0"/>
-              <a:t>bootstra</a:t>
-            </a:r>
-            <a:r>
-              <a:rPr lang="pt-PT" baseline="0" dirty="0" err="1" smtClean="0"/>
-              <a:t>p</a:t>
-            </a:r>
-            <a:r>
-              <a:rPr lang="pt-PT" baseline="0" dirty="0" smtClean="0"/>
-              <a:t>, </a:t>
-            </a:r>
-            <a:r>
-              <a:rPr lang="pt-PT" baseline="0" dirty="0" err="1" smtClean="0"/>
-              <a:t>entity</a:t>
-            </a:r>
-            <a:r>
-              <a:rPr lang="pt-PT" baseline="0" dirty="0" smtClean="0"/>
-              <a:t> </a:t>
-            </a:r>
-            <a:r>
-              <a:rPr lang="pt-PT" baseline="0" dirty="0" err="1" smtClean="0"/>
-              <a:t>framework</a:t>
-            </a:r>
-            <a:r>
-              <a:rPr lang="pt-PT" baseline="0" dirty="0" smtClean="0"/>
-              <a:t>, etc.</a:t>
-            </a:r>
-          </a:p>
-          <a:p>
-            <a:endParaRPr lang="pt-PT" baseline="0" dirty="0" smtClean="0"/>
-          </a:p>
-          <a:p>
-            <a:r>
-              <a:rPr lang="pt-PT" dirty="0" smtClean="0"/>
-              <a:t>- Criar formulários em que é possível adicionar imagens, ter </a:t>
-            </a:r>
-            <a:r>
-              <a:rPr lang="pt-PT" dirty="0" err="1" smtClean="0"/>
-              <a:t>dropdown</a:t>
-            </a:r>
-            <a:r>
-              <a:rPr lang="pt-PT" dirty="0" smtClean="0"/>
-              <a:t>,</a:t>
-            </a:r>
-            <a:r>
-              <a:rPr lang="pt-PT" baseline="0" dirty="0" smtClean="0"/>
-              <a:t> </a:t>
-            </a:r>
-            <a:r>
-              <a:rPr lang="pt-PT" baseline="0" dirty="0" err="1" smtClean="0"/>
-              <a:t>radiobutton</a:t>
-            </a:r>
-            <a:r>
-              <a:rPr lang="pt-PT" baseline="0" dirty="0" smtClean="0"/>
-              <a:t>, </a:t>
-            </a:r>
-            <a:r>
-              <a:rPr lang="pt-PT" baseline="0" dirty="0" err="1" smtClean="0"/>
-              <a:t>checkbox</a:t>
-            </a:r>
-            <a:r>
-              <a:rPr lang="pt-PT" baseline="0" dirty="0" smtClean="0"/>
-              <a:t> </a:t>
-            </a:r>
             <a:endParaRPr lang="pt-PT" dirty="0"/>
           </a:p>
         </p:txBody>
@@ -1144,135 +952,6 @@
               <a:buFontTx/>
               <a:buChar char="-"/>
             </a:pPr>
-            <a:r>
-              <a:rPr lang="pt-PT" dirty="0" smtClean="0"/>
-              <a:t>Criar um projeto MVC 4 Basic</a:t>
-            </a:r>
-          </a:p>
-          <a:p>
-            <a:pPr marL="171450" indent="-171450">
-              <a:buFontTx/>
-              <a:buChar char="-"/>
-            </a:pPr>
-            <a:r>
-              <a:rPr lang="pt-PT" dirty="0" smtClean="0"/>
-              <a:t>Colocar a correr e mostrar o erro</a:t>
-            </a:r>
-          </a:p>
-          <a:p>
-            <a:pPr marL="171450" indent="-171450">
-              <a:buFontTx/>
-              <a:buChar char="-"/>
-            </a:pPr>
-            <a:r>
-              <a:rPr lang="pt-PT" dirty="0" smtClean="0"/>
-              <a:t>Criar o </a:t>
-            </a:r>
-            <a:r>
-              <a:rPr lang="pt-PT" dirty="0" err="1" smtClean="0"/>
-              <a:t>controller</a:t>
-            </a:r>
-            <a:r>
-              <a:rPr lang="pt-PT" dirty="0" smtClean="0"/>
-              <a:t> </a:t>
-            </a:r>
-            <a:r>
-              <a:rPr lang="pt-PT" dirty="0" err="1" smtClean="0"/>
-              <a:t>Home</a:t>
-            </a:r>
-            <a:endParaRPr lang="pt-PT" dirty="0" smtClean="0"/>
-          </a:p>
-          <a:p>
-            <a:pPr marL="171450" indent="-171450">
-              <a:buFontTx/>
-              <a:buChar char="-"/>
-            </a:pPr>
-            <a:r>
-              <a:rPr lang="pt-PT" dirty="0" smtClean="0"/>
-              <a:t>Mostrar o erro</a:t>
-            </a:r>
-          </a:p>
-          <a:p>
-            <a:pPr marL="171450" indent="-171450">
-              <a:buFontTx/>
-              <a:buChar char="-"/>
-            </a:pPr>
-            <a:r>
-              <a:rPr lang="pt-PT" dirty="0" smtClean="0"/>
-              <a:t>Criar a </a:t>
-            </a:r>
-            <a:r>
-              <a:rPr lang="pt-PT" dirty="0" err="1" smtClean="0"/>
-              <a:t>view</a:t>
-            </a:r>
-            <a:r>
-              <a:rPr lang="pt-PT" dirty="0" smtClean="0"/>
-              <a:t> </a:t>
-            </a:r>
-            <a:r>
-              <a:rPr lang="pt-PT" dirty="0" err="1" smtClean="0"/>
-              <a:t>Index</a:t>
-            </a:r>
-            <a:endParaRPr lang="pt-PT" dirty="0" smtClean="0"/>
-          </a:p>
-          <a:p>
-            <a:pPr marL="171450" indent="-171450">
-              <a:buFontTx/>
-              <a:buChar char="-"/>
-            </a:pPr>
-            <a:r>
-              <a:rPr lang="pt-PT" dirty="0" smtClean="0"/>
-              <a:t>Mostrar a funcionar</a:t>
-            </a:r>
-          </a:p>
-          <a:p>
-            <a:pPr marL="171450" indent="-171450">
-              <a:buFontTx/>
-              <a:buChar char="-"/>
-            </a:pPr>
-            <a:r>
-              <a:rPr lang="pt-PT" dirty="0" smtClean="0"/>
-              <a:t>Criar um </a:t>
-            </a:r>
-            <a:r>
-              <a:rPr lang="pt-PT" dirty="0" err="1" smtClean="0"/>
-              <a:t>Model</a:t>
-            </a:r>
-            <a:r>
-              <a:rPr lang="pt-PT" dirty="0" smtClean="0"/>
-              <a:t> </a:t>
-            </a:r>
-            <a:r>
-              <a:rPr lang="pt-PT" dirty="0" err="1" smtClean="0"/>
-              <a:t>HelloModel</a:t>
-            </a:r>
-            <a:r>
-              <a:rPr lang="pt-PT" dirty="0" smtClean="0"/>
-              <a:t> com a propriedade</a:t>
-            </a:r>
-            <a:r>
-              <a:rPr lang="pt-PT" baseline="0" dirty="0" smtClean="0"/>
-              <a:t> </a:t>
-            </a:r>
-            <a:r>
-              <a:rPr lang="pt-PT" baseline="0" dirty="0" err="1" smtClean="0"/>
-              <a:t>Message</a:t>
-            </a:r>
-            <a:endParaRPr lang="pt-PT" baseline="0" dirty="0" smtClean="0"/>
-          </a:p>
-          <a:p>
-            <a:pPr marL="171450" indent="-171450">
-              <a:buFontTx/>
-              <a:buChar char="-"/>
-            </a:pPr>
-            <a:r>
-              <a:rPr lang="pt-PT" baseline="0" dirty="0" smtClean="0"/>
-              <a:t>Mostrar como enviar para a </a:t>
-            </a:r>
-            <a:r>
-              <a:rPr lang="pt-PT" baseline="0" dirty="0" err="1" smtClean="0"/>
-              <a:t>view</a:t>
-            </a:r>
             <a:endParaRPr lang="pt-PT" dirty="0"/>
           </a:p>
         </p:txBody>
@@ -1357,69 +1036,6 @@
           <a:bodyPr/>
           <a:lstStyle/>
           <a:p>
-            <a:r>
-              <a:rPr lang="pt-PT" dirty="0" err="1" smtClean="0"/>
-              <a:t>Model</a:t>
-            </a:r>
-            <a:r>
-              <a:rPr lang="pt-PT" baseline="0" dirty="0" smtClean="0"/>
-              <a:t> – Representa uma entidade da base de dados, ou seja, uma linha de uma tabela quando instanciada.</a:t>
-            </a:r>
-          </a:p>
-          <a:p>
-            <a:endParaRPr lang="pt-PT" baseline="0" dirty="0" smtClean="0"/>
-          </a:p>
-          <a:p>
-            <a:r>
-              <a:rPr lang="pt-PT" baseline="0" dirty="0" err="1" smtClean="0"/>
-              <a:t>View</a:t>
-            </a:r>
-            <a:r>
-              <a:rPr lang="pt-PT" baseline="0" dirty="0" smtClean="0"/>
-              <a:t> – Basicamente são as páginas HTML que contêm a informação a mostrar ao utilizador</a:t>
-            </a:r>
-          </a:p>
-          <a:p>
-            <a:endParaRPr lang="pt-PT" baseline="0" dirty="0" smtClean="0"/>
-          </a:p>
-          <a:p>
-            <a:r>
-              <a:rPr lang="pt-PT" baseline="0" dirty="0" err="1" smtClean="0"/>
-              <a:t>Controller</a:t>
-            </a:r>
-            <a:r>
-              <a:rPr lang="pt-PT" baseline="0" dirty="0" smtClean="0"/>
-              <a:t> – É responsável por receber os pedidos, processar e enviar uma resposta</a:t>
-            </a:r>
-            <a:r>
-              <a:rPr lang="pt-PT" baseline="0" dirty="0" smtClean="0"/>
-              <a:t>.</a:t>
-            </a:r>
-          </a:p>
-          <a:p>
-            <a:endParaRPr lang="pt-PT" baseline="0" dirty="0" smtClean="0"/>
-          </a:p>
-          <a:p>
-            <a:r>
-              <a:rPr lang="pt-PT" baseline="0" dirty="0" err="1" smtClean="0"/>
-              <a:t>Presentation</a:t>
-            </a:r>
-            <a:r>
-              <a:rPr lang="pt-PT" baseline="0" dirty="0" smtClean="0"/>
-              <a:t> </a:t>
-            </a:r>
-            <a:r>
-              <a:rPr lang="pt-PT" baseline="0" dirty="0" err="1" smtClean="0"/>
-              <a:t>Model</a:t>
-            </a:r>
-            <a:r>
-              <a:rPr lang="pt-PT" baseline="0" dirty="0" smtClean="0"/>
-              <a:t> – São objetos usados para colocar informação nas </a:t>
-            </a:r>
-            <a:r>
-              <a:rPr lang="pt-PT" baseline="0" dirty="0" err="1" smtClean="0"/>
-              <a:t>views</a:t>
-            </a:r>
             <a:endParaRPr lang="pt-PT" dirty="0"/>
           </a:p>
         </p:txBody>
@@ -1504,109 +1120,6 @@
           <a:bodyPr/>
           <a:lstStyle/>
           <a:p>
-            <a:r>
-              <a:rPr lang="pt-PT" dirty="0" err="1" smtClean="0"/>
-              <a:t>Model</a:t>
-            </a:r>
-            <a:r>
-              <a:rPr lang="pt-PT" baseline="0" dirty="0" smtClean="0"/>
-              <a:t> – Representa uma entidade da base de dados, ou seja, uma linha de uma tabela quando instanciada</a:t>
-            </a:r>
-            <a:r>
-              <a:rPr lang="pt-PT" baseline="0" dirty="0" smtClean="0"/>
-              <a:t>.</a:t>
-            </a:r>
-          </a:p>
-          <a:p>
-            <a:r>
-              <a:rPr lang="pt-PT" baseline="0" dirty="0" smtClean="0"/>
-              <a:t>Consiste nos objetos do core da aplicação</a:t>
-            </a:r>
-            <a:endParaRPr lang="pt-PT" baseline="0" dirty="0" smtClean="0"/>
-          </a:p>
-          <a:p>
-            <a:r>
-              <a:rPr lang="pt-PT" baseline="0" dirty="0" err="1" smtClean="0"/>
-              <a:t>Models</a:t>
-            </a:r>
-            <a:r>
-              <a:rPr lang="pt-PT" baseline="0" dirty="0" smtClean="0"/>
-              <a:t> – são a definição do universo da aplicação, numa aplicação bancária representa por exemplo todo o banco, desde as contas bancárias, os clientes, os limites</a:t>
-            </a:r>
-          </a:p>
-          <a:p>
-            <a:endParaRPr lang="pt-PT" baseline="0" dirty="0" smtClean="0"/>
-          </a:p>
-          <a:p>
-            <a:r>
-              <a:rPr lang="pt-PT" baseline="0" dirty="0" err="1" smtClean="0"/>
-              <a:t>View</a:t>
-            </a:r>
-            <a:r>
-              <a:rPr lang="pt-PT" baseline="0" dirty="0" smtClean="0"/>
-              <a:t> – Basicamente são as páginas HTML que contêm a informação a mostrar ao utilizador</a:t>
-            </a:r>
-          </a:p>
-          <a:p>
-            <a:endParaRPr lang="pt-PT" baseline="0" dirty="0" smtClean="0"/>
-          </a:p>
-          <a:p>
-            <a:r>
-              <a:rPr lang="pt-PT" baseline="0" dirty="0" err="1" smtClean="0"/>
-              <a:t>Controller</a:t>
-            </a:r>
-            <a:r>
-              <a:rPr lang="pt-PT" baseline="0" dirty="0" smtClean="0"/>
-              <a:t> – É responsável por receber os pedidos, processar e enviar uma resposta.</a:t>
-            </a:r>
-          </a:p>
-          <a:p>
-            <a:r>
-              <a:rPr lang="pt-PT" baseline="0" dirty="0" smtClean="0"/>
-              <a:t>Um </a:t>
-            </a:r>
-            <a:r>
-              <a:rPr lang="pt-PT" baseline="0" dirty="0" err="1" smtClean="0"/>
-              <a:t>controller</a:t>
-            </a:r>
-            <a:r>
-              <a:rPr lang="pt-PT" baseline="0" dirty="0" smtClean="0"/>
-              <a:t> tem </a:t>
-            </a:r>
-            <a:r>
-              <a:rPr lang="pt-PT" baseline="0" dirty="0" err="1" smtClean="0"/>
-              <a:t>actions</a:t>
-            </a:r>
-            <a:r>
-              <a:rPr lang="pt-PT" baseline="0" dirty="0" smtClean="0"/>
-              <a:t> que podem devolver vários tipos de informação, </a:t>
-            </a:r>
-            <a:r>
-              <a:rPr lang="pt-PT" baseline="0" dirty="0" err="1" smtClean="0"/>
-              <a:t>FileResult</a:t>
-            </a:r>
-            <a:r>
-              <a:rPr lang="pt-PT" baseline="0" dirty="0" smtClean="0"/>
-              <a:t>, </a:t>
-            </a:r>
-            <a:r>
-              <a:rPr lang="pt-PT" baseline="0" dirty="0" err="1" smtClean="0"/>
-              <a:t>JsonResult</a:t>
-            </a:r>
-            <a:r>
-              <a:rPr lang="pt-PT" baseline="0" dirty="0" smtClean="0"/>
-              <a:t>, etc.</a:t>
-            </a:r>
-            <a:endParaRPr lang="pt-PT" baseline="0" dirty="0" smtClean="0"/>
-          </a:p>
-          <a:p>
-            <a:endParaRPr lang="pt-PT" baseline="0" dirty="0" smtClean="0"/>
-          </a:p>
-          <a:p>
-            <a:r>
-              <a:rPr lang="pt-PT" baseline="0" dirty="0" smtClean="0"/>
-              <a:t>É importante perceber estes conceitos, tudo gira à volta disto.</a:t>
-            </a:r>
             <a:endParaRPr lang="pt-PT" dirty="0"/>
           </a:p>
         </p:txBody>
@@ -1691,14 +1204,6 @@
           <a:bodyPr/>
           <a:lstStyle/>
           <a:p>
-            <a:r>
-              <a:rPr lang="pt-PT" dirty="0" smtClean="0"/>
-              <a:t>Nas aplicações “tradicionais” ´MVC é a arquitetura que melhor se adequa</a:t>
-            </a:r>
-            <a:r>
-              <a:rPr lang="pt-PT" baseline="0" dirty="0" smtClean="0"/>
-              <a:t> provavelmente.</a:t>
-            </a:r>
             <a:endParaRPr lang="pt-PT" dirty="0"/>
           </a:p>
         </p:txBody>
@@ -1783,96 +1288,6 @@
           <a:bodyPr/>
           <a:lstStyle/>
           <a:p>
-            <a:r>
-              <a:rPr lang="pt-PT" dirty="0" err="1" smtClean="0"/>
-              <a:t>View</a:t>
-            </a:r>
-            <a:r>
-              <a:rPr lang="pt-PT" dirty="0" smtClean="0"/>
-              <a:t> </a:t>
-            </a:r>
-            <a:r>
-              <a:rPr lang="pt-PT" dirty="0" err="1" smtClean="0"/>
-              <a:t>State</a:t>
-            </a:r>
-            <a:r>
-              <a:rPr lang="pt-PT" dirty="0" smtClean="0"/>
-              <a:t> </a:t>
-            </a:r>
-            <a:r>
-              <a:rPr lang="pt-PT" dirty="0" err="1" smtClean="0"/>
-              <a:t>weight</a:t>
-            </a:r>
-            <a:r>
-              <a:rPr lang="pt-PT" dirty="0" smtClean="0"/>
-              <a:t> – o mecanismo utilizado</a:t>
-            </a:r>
-            <a:r>
-              <a:rPr lang="pt-PT" baseline="0" dirty="0" smtClean="0"/>
-              <a:t> para manter o estado entre pedidos resultava na grande troca de dados</a:t>
-            </a:r>
-          </a:p>
-          <a:p>
-            <a:endParaRPr lang="pt-PT" baseline="0" dirty="0" smtClean="0"/>
-          </a:p>
-          <a:p>
-            <a:r>
-              <a:rPr lang="pt-PT" baseline="0" dirty="0" smtClean="0"/>
-              <a:t>A forma como os eventos eram geridos por fezes era uma “caixa negra” e não se sabia muito bem que código </a:t>
-            </a:r>
-            <a:r>
-              <a:rPr lang="pt-PT" baseline="0" dirty="0" err="1" smtClean="0"/>
-              <a:t>javascript</a:t>
-            </a:r>
-            <a:r>
-              <a:rPr lang="pt-PT" baseline="0" dirty="0" smtClean="0"/>
-              <a:t> a </a:t>
-            </a:r>
-            <a:r>
-              <a:rPr lang="pt-PT" baseline="0" dirty="0" err="1" smtClean="0"/>
-              <a:t>framework</a:t>
-            </a:r>
-            <a:r>
-              <a:rPr lang="pt-PT" baseline="0" dirty="0" smtClean="0"/>
-              <a:t> gerava.</a:t>
-            </a:r>
-          </a:p>
-          <a:p>
-            <a:endParaRPr lang="pt-PT" baseline="0" dirty="0" smtClean="0"/>
-          </a:p>
-          <a:p>
-            <a:r>
-              <a:rPr lang="pt-PT" baseline="0" dirty="0" smtClean="0"/>
-              <a:t>Os testes não eram fáceis de fazer, a mistura dos conceitos e separação pouco clara das camadas lógicas</a:t>
-            </a:r>
-            <a:r>
-              <a:rPr lang="pt-PT" baseline="0" dirty="0" smtClean="0"/>
-              <a:t>.</a:t>
-            </a:r>
-          </a:p>
-          <a:p>
-            <a:endParaRPr lang="pt-PT" baseline="0" dirty="0" smtClean="0"/>
-          </a:p>
-          <a:p>
-            <a:r>
-              <a:rPr lang="pt-PT" baseline="0" dirty="0" smtClean="0"/>
-              <a:t>Permite ter pessoas de </a:t>
-            </a:r>
-            <a:r>
-              <a:rPr lang="pt-PT" baseline="0" dirty="0" err="1" smtClean="0"/>
-              <a:t>frontend</a:t>
-            </a:r>
-            <a:r>
-              <a:rPr lang="pt-PT" baseline="0" dirty="0" smtClean="0"/>
-              <a:t> e </a:t>
-            </a:r>
-            <a:r>
-              <a:rPr lang="pt-PT" baseline="0" dirty="0" err="1" smtClean="0"/>
-              <a:t>backend</a:t>
-            </a:r>
-            <a:endParaRPr lang="pt-PT" baseline="0" dirty="0" smtClean="0"/>
-          </a:p>
-          <a:p>
             <a:endParaRPr lang="pt-PT" dirty="0"/>
           </a:p>
         </p:txBody>
@@ -1957,34 +1372,6 @@
           <a:bodyPr/>
           <a:lstStyle/>
           <a:p>
-            <a:r>
-              <a:rPr lang="pt-PT" dirty="0" smtClean="0"/>
-              <a:t>Usar o projeto </a:t>
-            </a:r>
-            <a:r>
-              <a:rPr lang="pt-PT" dirty="0" err="1" smtClean="0"/>
-              <a:t>Hello</a:t>
-            </a:r>
-            <a:r>
-              <a:rPr lang="pt-PT" dirty="0" smtClean="0"/>
-              <a:t> </a:t>
-            </a:r>
-            <a:r>
-              <a:rPr lang="pt-PT" dirty="0" err="1" smtClean="0"/>
-              <a:t>World</a:t>
-            </a:r>
-            <a:r>
-              <a:rPr lang="pt-PT" dirty="0" smtClean="0"/>
-              <a:t> para</a:t>
-            </a:r>
-            <a:r>
-              <a:rPr lang="pt-PT" baseline="0" dirty="0" smtClean="0"/>
-              <a:t> mostrar ciclos, </a:t>
-            </a:r>
-            <a:r>
-              <a:rPr lang="pt-PT" baseline="0" dirty="0" err="1" smtClean="0"/>
-              <a:t>ifs</a:t>
-            </a:r>
             <a:endParaRPr lang="pt-PT" dirty="0"/>
           </a:p>
         </p:txBody>
@@ -2068,102 +1455,6 @@
         <p:txBody>
           <a:bodyPr/>
           <a:lstStyle/>
-          <a:p>
-            <a:r>
-              <a:rPr lang="pt-PT" dirty="0" smtClean="0"/>
-              <a:t>Mostrar como fazer </a:t>
-            </a:r>
-            <a:r>
-              <a:rPr lang="pt-PT" dirty="0" err="1" smtClean="0"/>
-              <a:t>debug</a:t>
-            </a:r>
-            <a:r>
-              <a:rPr lang="pt-PT" dirty="0" smtClean="0"/>
-              <a:t> em:</a:t>
-            </a:r>
-          </a:p>
-          <a:p>
-            <a:endParaRPr lang="pt-PT" dirty="0" smtClean="0"/>
-          </a:p>
-          <a:p>
-            <a:pPr marL="171450" indent="-171450">
-              <a:buFontTx/>
-              <a:buChar char="-"/>
-            </a:pPr>
-            <a:r>
-              <a:rPr lang="pt-PT" dirty="0" err="1" smtClean="0"/>
-              <a:t>Controller</a:t>
-            </a:r>
-            <a:endParaRPr lang="pt-PT" dirty="0" smtClean="0"/>
-          </a:p>
-          <a:p>
-            <a:pPr marL="171450" indent="-171450">
-              <a:buFontTx/>
-              <a:buChar char="-"/>
-            </a:pPr>
-            <a:r>
-              <a:rPr lang="pt-PT" dirty="0" err="1" smtClean="0"/>
-              <a:t>Model</a:t>
-            </a:r>
-            <a:endParaRPr lang="pt-PT" dirty="0" smtClean="0"/>
-          </a:p>
-          <a:p>
-            <a:pPr marL="171450" indent="-171450">
-              <a:buFontTx/>
-              <a:buChar char="-"/>
-            </a:pPr>
-            <a:r>
-              <a:rPr lang="pt-PT" dirty="0" err="1" smtClean="0"/>
-              <a:t>View</a:t>
-            </a:r>
-            <a:endParaRPr lang="pt-PT" dirty="0" smtClean="0"/>
-          </a:p>
-          <a:p>
-            <a:pPr marL="171450" indent="-171450">
-              <a:buFontTx/>
-              <a:buChar char="-"/>
-            </a:pPr>
-            <a:r>
-              <a:rPr lang="pt-PT" dirty="0" err="1" smtClean="0"/>
-              <a:t>Javascript</a:t>
-            </a:r>
-            <a:endParaRPr lang="pt-PT" dirty="0" smtClean="0"/>
-          </a:p>
-          <a:p>
-            <a:pPr marL="0" indent="0">
-              <a:buFontTx/>
-              <a:buNone/>
-            </a:pPr>
-            <a:endParaRPr lang="pt-PT" dirty="0" smtClean="0"/>
-          </a:p>
-          <a:p>
-            <a:pPr marL="171450" indent="-171450">
-              <a:buFontTx/>
-              <a:buChar char="-"/>
-            </a:pPr>
-            <a:r>
-              <a:rPr lang="pt-PT" baseline="0" dirty="0" smtClean="0"/>
-              <a:t>Dicas de navegação</a:t>
-            </a:r>
-          </a:p>
-          <a:p>
-            <a:pPr marL="171450" indent="-171450">
-              <a:buFontTx/>
-              <a:buChar char="-"/>
-            </a:pPr>
-            <a:r>
-              <a:rPr lang="pt-PT" baseline="0" dirty="0" smtClean="0"/>
-              <a:t>Mostrar o </a:t>
-            </a:r>
-            <a:r>
-              <a:rPr lang="pt-PT" baseline="0" dirty="0" err="1" smtClean="0"/>
-              <a:t>resharper</a:t>
-            </a:r>
-            <a:r>
-              <a:rPr lang="pt-PT" baseline="0" dirty="0" smtClean="0"/>
-              <a:t> e dizer como podem instalar</a:t>
-            </a:r>
-          </a:p>
           <a:p>
             <a:pPr marL="171450" indent="-171450">
               <a:buFontTx/>
@@ -2340,7 +1631,7 @@
           <a:p>
             <a:fld id="{58EB6F0E-7DF8-4D98-A070-2BACEF830D93}" type="datetime1">
               <a:rPr lang="pt-PT" smtClean="0"/>
-              <a:t>05/05/2015</a:t>
+              <a:t>17/05/2015</a:t>
             </a:fld>
             <a:endParaRPr lang="pt-PT"/>
           </a:p>
@@ -2514,7 +1805,7 @@
           <a:p>
             <a:fld id="{3169938F-EC71-4185-8015-244D179927D3}" type="datetime1">
               <a:rPr lang="pt-PT" smtClean="0"/>
-              <a:t>05/05/2015</a:t>
+              <a:t>17/05/2015</a:t>
             </a:fld>
             <a:endParaRPr lang="pt-PT"/>
           </a:p>
@@ -2698,7 +1989,7 @@
           <a:p>
             <a:fld id="{A186E1E7-4D52-4ACC-BB1B-6E18A96C46F7}" type="datetime1">
               <a:rPr lang="pt-PT" smtClean="0"/>
-              <a:t>05/05/2015</a:t>
+              <a:t>17/05/2015</a:t>
             </a:fld>
             <a:endParaRPr lang="pt-PT"/>
           </a:p>
@@ -2872,7 +2163,7 @@
           <a:p>
             <a:fld id="{A0CC031B-E743-4DFB-B25B-230B5EE15641}" type="datetime1">
               <a:rPr lang="pt-PT" smtClean="0"/>
-              <a:t>05/05/2015</a:t>
+              <a:t>17/05/2015</a:t>
             </a:fld>
             <a:endParaRPr lang="pt-PT"/>
           </a:p>
@@ -3122,7 +2413,7 @@
           <a:p>
             <a:fld id="{9FBDF9A9-B706-4FE9-86F8-F31BF4E2942A}" type="datetime1">
               <a:rPr lang="pt-PT" smtClean="0"/>
-              <a:t>05/05/2015</a:t>
+              <a:t>17/05/2015</a:t>
             </a:fld>
             <a:endParaRPr lang="pt-PT"/>
           </a:p>
@@ -3358,7 +2649,7 @@
           <a:p>
             <a:fld id="{6A1B0442-92CF-4CAA-A485-1F9D54580546}" type="datetime1">
               <a:rPr lang="pt-PT" smtClean="0"/>
-              <a:t>05/05/2015</a:t>
+              <a:t>17/05/2015</a:t>
             </a:fld>
             <a:endParaRPr lang="pt-PT"/>
           </a:p>
@@ -3729,7 +3020,7 @@
           <a:p>
             <a:fld id="{B0684B70-B20D-4BBF-AC2B-24EFD9EE71F0}" type="datetime1">
               <a:rPr lang="pt-PT" smtClean="0"/>
-              <a:t>05/05/2015</a:t>
+              <a:t>17/05/2015</a:t>
             </a:fld>
             <a:endParaRPr lang="pt-PT"/>
           </a:p>
@@ -3851,7 +3142,7 @@
           <a:p>
             <a:fld id="{D635BBEE-5B13-4330-9F9F-A72278E7D4AE}" type="datetime1">
               <a:rPr lang="pt-PT" smtClean="0"/>
-              <a:t>05/05/2015</a:t>
+              <a:t>17/05/2015</a:t>
             </a:fld>
             <a:endParaRPr lang="pt-PT"/>
           </a:p>
@@ -3950,7 +3241,7 @@
           <a:p>
             <a:fld id="{69326E18-6BD8-4663-95CE-85B431D1DFF5}" type="datetime1">
               <a:rPr lang="pt-PT" smtClean="0"/>
-              <a:t>05/05/2015</a:t>
+              <a:t>17/05/2015</a:t>
             </a:fld>
             <a:endParaRPr lang="pt-PT"/>
           </a:p>
@@ -4231,7 +3522,7 @@
           <a:p>
             <a:fld id="{5D4EFB89-94AB-46E6-A12D-3F07393E70FF}" type="datetime1">
               <a:rPr lang="pt-PT" smtClean="0"/>
-              <a:t>05/05/2015</a:t>
+              <a:t>17/05/2015</a:t>
             </a:fld>
             <a:endParaRPr lang="pt-PT"/>
           </a:p>
@@ -4488,7 +3779,7 @@
           <a:p>
             <a:fld id="{CBB368D8-9674-4248-B6BB-4E2EBFA19C33}" type="datetime1">
               <a:rPr lang="pt-PT" smtClean="0"/>
-              <a:t>05/05/2015</a:t>
+              <a:t>17/05/2015</a:t>
             </a:fld>
             <a:endParaRPr lang="pt-PT"/>
           </a:p>
@@ -4705,7 +3996,7 @@
           <a:p>
             <a:fld id="{E1B2A735-2797-4EDA-9F1C-4C4E020EDD29}" type="datetime1">
               <a:rPr lang="pt-PT" smtClean="0"/>
-              <a:t>05/05/2015</a:t>
+              <a:t>17/05/2015</a:t>
             </a:fld>
             <a:endParaRPr lang="pt-PT"/>
           </a:p>
@@ -5510,11 +4801,7 @@
             </a:r>
             <a:r>
               <a:rPr lang="pt-PT" dirty="0" smtClean="0"/>
-              <a:t>que permite inserir código diretamente na camada de visualização da aplicação, facilitando a codificação do projeto</a:t>
-            </a:r>
-            <a:r>
-              <a:rPr lang="pt-PT" dirty="0" smtClean="0"/>
-              <a:t>.</a:t>
+              <a:t>que permite inserir código diretamente na camada de visualização da aplicação, facilitando a codificação do projeto.</a:t>
             </a:r>
           </a:p>
           <a:p>
@@ -8087,7 +7374,6 @@
               <a:rPr lang="pt-PT" dirty="0" smtClean="0"/>
               <a:t>CSS</a:t>
             </a:r>
-            <a:endParaRPr lang="pt-PT" dirty="0" smtClean="0"/>
           </a:p>
           <a:p>
             <a:r>
@@ -8495,7 +7781,6 @@
               <a:rPr lang="pt-PT" dirty="0"/>
               <a:t>, 2012</a:t>
             </a:r>
-            <a:endParaRPr lang="pt-PT" dirty="0"/>
           </a:p>
         </p:txBody>
       </p:sp>
@@ -9037,7 +8322,6 @@
               <a:rPr lang="pt-PT" dirty="0" smtClean="0"/>
               <a:t>Referências</a:t>
             </a:r>
-            <a:endParaRPr lang="pt-PT" dirty="0" smtClean="0"/>
           </a:p>
           <a:p>
             <a:endParaRPr lang="pt-PT" dirty="0"/>
@@ -9362,7 +8646,6 @@
               <a:rPr lang="pt-PT" dirty="0"/>
               <a:t>https://pt.linkedin.com/in/miguelpintodacosta</a:t>
             </a:r>
-            <a:endParaRPr lang="pt-PT" dirty="0"/>
           </a:p>
         </p:txBody>
       </p:sp>
@@ -10237,11 +9520,7 @@
             </a:r>
             <a:r>
               <a:rPr lang="pt-PT" dirty="0" smtClean="0"/>
-              <a:t> – Representa ou contêm os dados que os que os utilizadores acedem</a:t>
-            </a:r>
-            <a:r>
-              <a:rPr lang="pt-PT" dirty="0" smtClean="0"/>
-              <a:t>.</a:t>
+              <a:t> – Representa ou contêm os dados que os que os utilizadores acedem.</a:t>
             </a:r>
           </a:p>
           <a:p>
@@ -10254,11 +9533,7 @@
             </a:r>
             <a:r>
               <a:rPr lang="pt-PT" dirty="0" smtClean="0"/>
-              <a:t> – Usada para apresentar ao utilizador as páginas HTML</a:t>
-            </a:r>
-            <a:r>
-              <a:rPr lang="pt-PT" dirty="0" smtClean="0"/>
-              <a:t>.</a:t>
+              <a:t> – Usada para apresentar ao utilizador as páginas HTML.</a:t>
             </a:r>
           </a:p>
           <a:p>
@@ -10615,24 +9890,16 @@
             </a:r>
             <a:r>
               <a:rPr lang="pt-PT" dirty="0" smtClean="0"/>
-              <a:t> de desenvolvimento Web da Microsoft que combina eficácia e características da arquitetura </a:t>
-            </a:r>
+              <a:t> de desenvolvimento Web da Microsoft que combina eficácia e características da arquitetura MVC.</a:t>
+            </a:r>
+          </a:p>
+          <a:p>
+            <a:endParaRPr lang="pt-PT" dirty="0" smtClean="0"/>
+          </a:p>
+          <a:p>
             <a:r>
               <a:rPr lang="pt-PT" dirty="0" smtClean="0"/>
-              <a:t>MVC.</a:t>
-            </a:r>
-          </a:p>
-          <a:p>
-            <a:endParaRPr lang="pt-PT" dirty="0" smtClean="0"/>
-          </a:p>
-          <a:p>
-            <a:r>
-              <a:rPr lang="pt-PT" dirty="0" smtClean="0"/>
-              <a:t>Aplica as técnicas mais recentes de desenvolvimento </a:t>
-            </a:r>
-            <a:r>
-              <a:rPr lang="pt-PT" dirty="0" smtClean="0"/>
-              <a:t>ágil.</a:t>
+              <a:t>Aplica as técnicas mais recentes de desenvolvimento ágil.</a:t>
             </a:r>
           </a:p>
           <a:p>
@@ -10828,11 +10095,7 @@
             </a:r>
             <a:r>
               <a:rPr lang="pt-PT" dirty="0" smtClean="0"/>
-              <a:t> foi bastante adotado, mas ao longo do tempo apresentava algumas deficiências</a:t>
-            </a:r>
-            <a:r>
-              <a:rPr lang="pt-PT" dirty="0" smtClean="0"/>
-              <a:t>:</a:t>
+              <a:t> foi bastante adotado, mas ao longo do tempo apresentava algumas deficiências:</a:t>
             </a:r>
           </a:p>
           <a:p>
@@ -10848,11 +10111,16 @@
             </a:r>
             <a:r>
               <a:rPr lang="pt-PT" dirty="0" smtClean="0"/>
-              <a:t> mecanismo para manter o estado entre pedidos obrigava à troca de grandes blocos de </a:t>
-            </a:r>
+              <a:t> mecanismo para manter o estado entre pedidos obrigava à troca de grandes blocos de dados,</a:t>
+            </a:r>
+          </a:p>
+          <a:p>
+            <a:endParaRPr lang="pt-PT" dirty="0" smtClean="0"/>
+          </a:p>
+          <a:p>
             <a:r>
               <a:rPr lang="pt-PT" dirty="0" smtClean="0"/>
-              <a:t>dados,</a:t>
+              <a:t>o mecanismo para ligar os eventos do lado do cliente com o servidor por vezes era complicado,</a:t>
             </a:r>
           </a:p>
           <a:p>
@@ -10861,24 +10129,7 @@
           <a:p>
             <a:r>
               <a:rPr lang="pt-PT" dirty="0" smtClean="0"/>
-              <a:t>o mecanismo para ligar os eventos do lado do cliente com o servidor por vezes era </a:t>
-            </a:r>
-            <a:r>
-              <a:rPr lang="pt-PT" dirty="0" smtClean="0"/>
-              <a:t>complicado,</a:t>
-            </a:r>
-          </a:p>
-          <a:p>
-            <a:endParaRPr lang="pt-PT" dirty="0" smtClean="0"/>
-          </a:p>
-          <a:p>
-            <a:r>
-              <a:rPr lang="pt-PT" dirty="0" smtClean="0"/>
-              <a:t>dificuldade em automatizar </a:t>
-            </a:r>
-            <a:r>
-              <a:rPr lang="pt-PT" dirty="0" smtClean="0"/>
-              <a:t>testes,</a:t>
+              <a:t>dificuldade em automatizar testes,</a:t>
             </a:r>
           </a:p>
           <a:p>
@@ -10889,7 +10140,6 @@
               <a:rPr lang="pt-PT" dirty="0" smtClean="0"/>
               <a:t>ajuda na separação das camadas lógicas o que facilita o trabalho de equipa</a:t>
             </a:r>
-            <a:endParaRPr lang="pt-PT" dirty="0" smtClean="0"/>
           </a:p>
           <a:p>
             <a:endParaRPr lang="pt-PT" dirty="0" smtClean="0"/>

</xml_diff>